<commit_message>
presentation charts corrected and standardized
</commit_message>
<xml_diff>
--- a/Project 1 Deck.pptx
+++ b/Project 1 Deck.pptx
@@ -13,15 +13,16 @@
     <p:sldId id="276" r:id="rId7"/>
     <p:sldId id="263" r:id="rId8"/>
     <p:sldId id="264" r:id="rId9"/>
-    <p:sldId id="258" r:id="rId10"/>
-    <p:sldId id="268" r:id="rId11"/>
-    <p:sldId id="265" r:id="rId12"/>
-    <p:sldId id="269" r:id="rId13"/>
-    <p:sldId id="271" r:id="rId14"/>
-    <p:sldId id="272" r:id="rId15"/>
-    <p:sldId id="274" r:id="rId16"/>
-    <p:sldId id="275" r:id="rId17"/>
-    <p:sldId id="262" r:id="rId18"/>
+    <p:sldId id="277" r:id="rId10"/>
+    <p:sldId id="258" r:id="rId11"/>
+    <p:sldId id="268" r:id="rId12"/>
+    <p:sldId id="265" r:id="rId13"/>
+    <p:sldId id="269" r:id="rId14"/>
+    <p:sldId id="271" r:id="rId15"/>
+    <p:sldId id="272" r:id="rId16"/>
+    <p:sldId id="274" r:id="rId17"/>
+    <p:sldId id="275" r:id="rId18"/>
+    <p:sldId id="262" r:id="rId19"/>
   </p:sldIdLst>
   <p:sldSz cx="12192000" cy="6858000"/>
   <p:notesSz cx="6858000" cy="9144000"/>
@@ -314,7 +315,7 @@
           <a:p>
             <a:fld id="{4E24DB50-D5B3-48DA-BEE7-9AC0543D8772}" type="datetimeFigureOut">
               <a:rPr lang="en-US" smtClean="0"/>
-              <a:t>7/27/2020</a:t>
+              <a:t>2020-07-28</a:t>
             </a:fld>
             <a:endParaRPr lang="en-US"/>
           </a:p>
@@ -589,7 +590,7 @@
           <a:p>
             <a:fld id="{4E24DB50-D5B3-48DA-BEE7-9AC0543D8772}" type="datetimeFigureOut">
               <a:rPr lang="en-US" smtClean="0"/>
-              <a:t>7/27/2020</a:t>
+              <a:t>2020-07-28</a:t>
             </a:fld>
             <a:endParaRPr lang="en-US"/>
           </a:p>
@@ -783,7 +784,7 @@
           <a:p>
             <a:fld id="{4E24DB50-D5B3-48DA-BEE7-9AC0543D8772}" type="datetimeFigureOut">
               <a:rPr lang="en-US" smtClean="0"/>
-              <a:t>7/27/2020</a:t>
+              <a:t>2020-07-28</a:t>
             </a:fld>
             <a:endParaRPr lang="en-US"/>
           </a:p>
@@ -1056,7 +1057,7 @@
           <a:p>
             <a:fld id="{4E24DB50-D5B3-48DA-BEE7-9AC0543D8772}" type="datetimeFigureOut">
               <a:rPr lang="en-US" smtClean="0"/>
-              <a:t>7/27/2020</a:t>
+              <a:t>2020-07-28</a:t>
             </a:fld>
             <a:endParaRPr lang="en-US"/>
           </a:p>
@@ -1397,7 +1398,7 @@
           <a:p>
             <a:fld id="{4E24DB50-D5B3-48DA-BEE7-9AC0543D8772}" type="datetimeFigureOut">
               <a:rPr lang="en-US" smtClean="0"/>
-              <a:t>7/27/2020</a:t>
+              <a:t>2020-07-28</a:t>
             </a:fld>
             <a:endParaRPr lang="en-US"/>
           </a:p>
@@ -2020,7 +2021,7 @@
           <a:p>
             <a:fld id="{4E24DB50-D5B3-48DA-BEE7-9AC0543D8772}" type="datetimeFigureOut">
               <a:rPr lang="en-US" smtClean="0"/>
-              <a:t>7/27/2020</a:t>
+              <a:t>2020-07-28</a:t>
             </a:fld>
             <a:endParaRPr lang="en-US"/>
           </a:p>
@@ -2880,7 +2881,7 @@
           <a:p>
             <a:fld id="{4E24DB50-D5B3-48DA-BEE7-9AC0543D8772}" type="datetimeFigureOut">
               <a:rPr lang="en-US" smtClean="0"/>
-              <a:t>7/27/2020</a:t>
+              <a:t>2020-07-28</a:t>
             </a:fld>
             <a:endParaRPr lang="en-US"/>
           </a:p>
@@ -3050,7 +3051,7 @@
           <a:p>
             <a:fld id="{4E24DB50-D5B3-48DA-BEE7-9AC0543D8772}" type="datetimeFigureOut">
               <a:rPr lang="en-US" smtClean="0"/>
-              <a:t>7/27/2020</a:t>
+              <a:t>2020-07-28</a:t>
             </a:fld>
             <a:endParaRPr lang="en-US"/>
           </a:p>
@@ -3230,7 +3231,7 @@
           <a:p>
             <a:fld id="{4E24DB50-D5B3-48DA-BEE7-9AC0543D8772}" type="datetimeFigureOut">
               <a:rPr lang="en-US" smtClean="0"/>
-              <a:t>7/27/2020</a:t>
+              <a:t>2020-07-28</a:t>
             </a:fld>
             <a:endParaRPr lang="en-US"/>
           </a:p>
@@ -3400,7 +3401,7 @@
           <a:p>
             <a:fld id="{4E24DB50-D5B3-48DA-BEE7-9AC0543D8772}" type="datetimeFigureOut">
               <a:rPr lang="en-US" smtClean="0"/>
-              <a:t>7/27/2020</a:t>
+              <a:t>2020-07-28</a:t>
             </a:fld>
             <a:endParaRPr lang="en-US"/>
           </a:p>
@@ -3647,7 +3648,7 @@
           <a:p>
             <a:fld id="{4E24DB50-D5B3-48DA-BEE7-9AC0543D8772}" type="datetimeFigureOut">
               <a:rPr lang="en-US" smtClean="0"/>
-              <a:t>7/27/2020</a:t>
+              <a:t>2020-07-28</a:t>
             </a:fld>
             <a:endParaRPr lang="en-US"/>
           </a:p>
@@ -3939,7 +3940,7 @@
           <a:p>
             <a:fld id="{4E24DB50-D5B3-48DA-BEE7-9AC0543D8772}" type="datetimeFigureOut">
               <a:rPr lang="en-US" smtClean="0"/>
-              <a:t>7/27/2020</a:t>
+              <a:t>2020-07-28</a:t>
             </a:fld>
             <a:endParaRPr lang="en-US"/>
           </a:p>
@@ -4383,7 +4384,7 @@
           <a:p>
             <a:fld id="{4E24DB50-D5B3-48DA-BEE7-9AC0543D8772}" type="datetimeFigureOut">
               <a:rPr lang="en-US" smtClean="0"/>
-              <a:t>7/27/2020</a:t>
+              <a:t>2020-07-28</a:t>
             </a:fld>
             <a:endParaRPr lang="en-US"/>
           </a:p>
@@ -4501,7 +4502,7 @@
           <a:p>
             <a:fld id="{4E24DB50-D5B3-48DA-BEE7-9AC0543D8772}" type="datetimeFigureOut">
               <a:rPr lang="en-US" smtClean="0"/>
-              <a:t>7/27/2020</a:t>
+              <a:t>2020-07-28</a:t>
             </a:fld>
             <a:endParaRPr lang="en-US"/>
           </a:p>
@@ -4596,7 +4597,7 @@
           <a:p>
             <a:fld id="{4E24DB50-D5B3-48DA-BEE7-9AC0543D8772}" type="datetimeFigureOut">
               <a:rPr lang="en-US" smtClean="0"/>
-              <a:t>7/27/2020</a:t>
+              <a:t>2020-07-28</a:t>
             </a:fld>
             <a:endParaRPr lang="en-US"/>
           </a:p>
@@ -4875,7 +4876,7 @@
           <a:p>
             <a:fld id="{4E24DB50-D5B3-48DA-BEE7-9AC0543D8772}" type="datetimeFigureOut">
               <a:rPr lang="en-US" smtClean="0"/>
-              <a:t>7/27/2020</a:t>
+              <a:t>2020-07-28</a:t>
             </a:fld>
             <a:endParaRPr lang="en-US"/>
           </a:p>
@@ -5150,7 +5151,7 @@
           <a:p>
             <a:fld id="{4E24DB50-D5B3-48DA-BEE7-9AC0543D8772}" type="datetimeFigureOut">
               <a:rPr lang="en-US" smtClean="0"/>
-              <a:t>7/27/2020</a:t>
+              <a:t>2020-07-28</a:t>
             </a:fld>
             <a:endParaRPr lang="en-US"/>
           </a:p>
@@ -5579,7 +5580,7 @@
           <a:p>
             <a:fld id="{4E24DB50-D5B3-48DA-BEE7-9AC0543D8772}" type="datetimeFigureOut">
               <a:rPr lang="en-US" smtClean="0"/>
-              <a:t>7/27/2020</a:t>
+              <a:t>2020-07-28</a:t>
             </a:fld>
             <a:endParaRPr lang="en-US"/>
           </a:p>
@@ -6303,10 +6304,10 @@
       </p:sp>
       <p:pic>
         <p:nvPicPr>
-          <p:cNvPr id="6" name="Picture 5" descr="A screenshot of a cell phone&#10;&#10;Description automatically generated">
+          <p:cNvPr id="13" name="Picture 12" descr="A screenshot of a cell phone&#10;&#10;Description automatically generated">
             <a:extLst>
               <a:ext uri="{FF2B5EF4-FFF2-40B4-BE49-F238E27FC236}">
-                <a16:creationId xmlns:a16="http://schemas.microsoft.com/office/drawing/2014/main" id="{AD8F1C5B-D593-457F-935E-C91E3B4BEFAC}"/>
+                <a16:creationId xmlns:a16="http://schemas.microsoft.com/office/drawing/2014/main" id="{F9908A5A-8DE4-4AE4-A4BE-8A6C552EC7EA}"/>
               </a:ext>
             </a:extLst>
           </p:cNvPr>
@@ -6329,8 +6330,8 @@
         </p:blipFill>
         <p:spPr>
           <a:xfrm>
-            <a:off x="341688" y="1599783"/>
-            <a:ext cx="5586125" cy="3658433"/>
+            <a:off x="608350" y="1599782"/>
+            <a:ext cx="5487650" cy="3658433"/>
           </a:xfrm>
           <a:prstGeom prst="rect">
             <a:avLst/>
@@ -6339,10 +6340,10 @@
       </p:pic>
       <p:pic>
         <p:nvPicPr>
-          <p:cNvPr id="11" name="Picture 10" descr="A screenshot of a cell phone&#10;&#10;Description automatically generated">
+          <p:cNvPr id="15" name="Picture 14">
             <a:extLst>
               <a:ext uri="{FF2B5EF4-FFF2-40B4-BE49-F238E27FC236}">
-                <a16:creationId xmlns:a16="http://schemas.microsoft.com/office/drawing/2014/main" id="{91218B9B-91CD-4FC1-9A7F-9668987F4690}"/>
+                <a16:creationId xmlns:a16="http://schemas.microsoft.com/office/drawing/2014/main" id="{DE447308-7F16-469D-B144-5FFA43026265}"/>
               </a:ext>
             </a:extLst>
           </p:cNvPr>
@@ -6365,7 +6366,7 @@
         </p:blipFill>
         <p:spPr>
           <a:xfrm>
-            <a:off x="6264187" y="1599783"/>
+            <a:off x="6228520" y="1599781"/>
             <a:ext cx="5487650" cy="3658433"/>
           </a:xfrm>
           <a:prstGeom prst="rect">
@@ -6376,7 +6377,7 @@
     </p:spTree>
     <p:extLst>
       <p:ext uri="{BB962C8B-B14F-4D97-AF65-F5344CB8AC3E}">
-        <p14:creationId xmlns:p14="http://schemas.microsoft.com/office/powerpoint/2010/main" val="3623486350"/>
+        <p14:creationId xmlns:p14="http://schemas.microsoft.com/office/powerpoint/2010/main" val="3291382045"/>
       </p:ext>
     </p:extLst>
   </p:cSld>
@@ -6433,7 +6434,7 @@
           <a:p>
             <a:r>
               <a:rPr lang="en-US" u="sng" dirty="0"/>
-              <a:t>Results – Poverty Rate </a:t>
+              <a:t>Results – Race</a:t>
             </a:r>
           </a:p>
         </p:txBody>
@@ -6456,8 +6457,8 @@
         </p:nvSpPr>
         <p:spPr>
           <a:xfrm>
-            <a:off x="1524000" y="5556737"/>
-            <a:ext cx="9144000" cy="900333"/>
+            <a:off x="1524000" y="5570805"/>
+            <a:ext cx="9144000" cy="886265"/>
           </a:xfrm>
         </p:spPr>
         <p:txBody>
@@ -6478,10 +6479,10 @@
       </p:sp>
       <p:pic>
         <p:nvPicPr>
-          <p:cNvPr id="5" name="Picture 4" descr="A screenshot of a cell phone&#10;&#10;Description automatically generated">
+          <p:cNvPr id="13" name="Picture 12" descr="A screenshot of a cell phone&#10;&#10;Description automatically generated">
             <a:extLst>
               <a:ext uri="{FF2B5EF4-FFF2-40B4-BE49-F238E27FC236}">
-                <a16:creationId xmlns:a16="http://schemas.microsoft.com/office/drawing/2014/main" id="{13D96B71-4F17-4D40-A7D6-2511D6B7A2C2}"/>
+                <a16:creationId xmlns:a16="http://schemas.microsoft.com/office/drawing/2014/main" id="{10323F94-9E80-496E-97A2-92C07CA1D691}"/>
               </a:ext>
             </a:extLst>
           </p:cNvPr>
@@ -6504,7 +6505,43 @@
         </p:blipFill>
         <p:spPr>
           <a:xfrm>
-            <a:off x="2184557" y="1599783"/>
+            <a:off x="608350" y="1599780"/>
+            <a:ext cx="5487650" cy="3658433"/>
+          </a:xfrm>
+          <a:prstGeom prst="rect">
+            <a:avLst/>
+          </a:prstGeom>
+        </p:spPr>
+      </p:pic>
+      <p:pic>
+        <p:nvPicPr>
+          <p:cNvPr id="15" name="Picture 14" descr="A screenshot of a map&#10;&#10;Description automatically generated">
+            <a:extLst>
+              <a:ext uri="{FF2B5EF4-FFF2-40B4-BE49-F238E27FC236}">
+                <a16:creationId xmlns:a16="http://schemas.microsoft.com/office/drawing/2014/main" id="{DB722D45-E894-4BF1-A28C-261894D8ADD8}"/>
+              </a:ext>
+            </a:extLst>
+          </p:cNvPr>
+          <p:cNvPicPr>
+            <a:picLocks noChangeAspect="1"/>
+          </p:cNvPicPr>
+          <p:nvPr/>
+        </p:nvPicPr>
+        <p:blipFill>
+          <a:blip r:embed="rId3">
+            <a:extLst>
+              <a:ext uri="{28A0092B-C50C-407E-A947-70E740481C1C}">
+                <a14:useLocalDpi xmlns:a14="http://schemas.microsoft.com/office/drawing/2010/main" val="0"/>
+              </a:ext>
+            </a:extLst>
+          </a:blip>
+          <a:stretch>
+            <a:fillRect/>
+          </a:stretch>
+        </p:blipFill>
+        <p:spPr>
+          <a:xfrm>
+            <a:off x="6228520" y="1599779"/>
             <a:ext cx="5487650" cy="3658433"/>
           </a:xfrm>
           <a:prstGeom prst="rect">
@@ -6515,7 +6552,7 @@
     </p:spTree>
     <p:extLst>
       <p:ext uri="{BB962C8B-B14F-4D97-AF65-F5344CB8AC3E}">
-        <p14:creationId xmlns:p14="http://schemas.microsoft.com/office/powerpoint/2010/main" val="2359869069"/>
+        <p14:creationId xmlns:p14="http://schemas.microsoft.com/office/powerpoint/2010/main" val="3623486350"/>
       </p:ext>
     </p:extLst>
   </p:cSld>
@@ -6572,7 +6609,7 @@
           <a:p>
             <a:r>
               <a:rPr lang="en-US" u="sng" dirty="0"/>
-              <a:t>Results – Job Type </a:t>
+              <a:t>Results – Poverty Rate </a:t>
             </a:r>
           </a:p>
         </p:txBody>
@@ -6620,7 +6657,7 @@
           <p:cNvPr id="6" name="Picture 5" descr="A screenshot of a cell phone&#10;&#10;Description automatically generated">
             <a:extLst>
               <a:ext uri="{FF2B5EF4-FFF2-40B4-BE49-F238E27FC236}">
-                <a16:creationId xmlns:a16="http://schemas.microsoft.com/office/drawing/2014/main" id="{669E6734-3C6B-4C5A-94EC-F3E0DF763DA9}"/>
+                <a16:creationId xmlns:a16="http://schemas.microsoft.com/office/drawing/2014/main" id="{E04D8987-F259-4EA8-AA6F-424D4BE6BFE0}"/>
               </a:ext>
             </a:extLst>
           </p:cNvPr>
@@ -6643,43 +6680,7 @@
         </p:blipFill>
         <p:spPr>
           <a:xfrm>
-            <a:off x="805923" y="1652536"/>
-            <a:ext cx="5487650" cy="3658433"/>
-          </a:xfrm>
-          <a:prstGeom prst="rect">
-            <a:avLst/>
-          </a:prstGeom>
-        </p:spPr>
-      </p:pic>
-      <p:pic>
-        <p:nvPicPr>
-          <p:cNvPr id="8" name="Picture 7" descr="A screenshot of a cell phone&#10;&#10;Description automatically generated">
-            <a:extLst>
-              <a:ext uri="{FF2B5EF4-FFF2-40B4-BE49-F238E27FC236}">
-                <a16:creationId xmlns:a16="http://schemas.microsoft.com/office/drawing/2014/main" id="{4AC1DAAB-16B2-40CF-A3B7-B858BB81C172}"/>
-              </a:ext>
-            </a:extLst>
-          </p:cNvPr>
-          <p:cNvPicPr>
-            <a:picLocks noChangeAspect="1"/>
-          </p:cNvPicPr>
-          <p:nvPr/>
-        </p:nvPicPr>
-        <p:blipFill>
-          <a:blip r:embed="rId3">
-            <a:extLst>
-              <a:ext uri="{28A0092B-C50C-407E-A947-70E740481C1C}">
-                <a14:useLocalDpi xmlns:a14="http://schemas.microsoft.com/office/drawing/2010/main" val="0"/>
-              </a:ext>
-            </a:extLst>
-          </a:blip>
-          <a:stretch>
-            <a:fillRect/>
-          </a:stretch>
-        </p:blipFill>
-        <p:spPr>
-          <a:xfrm>
-            <a:off x="6573676" y="1652535"/>
+            <a:off x="3352175" y="1599783"/>
             <a:ext cx="5487650" cy="3658433"/>
           </a:xfrm>
           <a:prstGeom prst="rect">
@@ -6690,7 +6691,7 @@
     </p:spTree>
     <p:extLst>
       <p:ext uri="{BB962C8B-B14F-4D97-AF65-F5344CB8AC3E}">
-        <p14:creationId xmlns:p14="http://schemas.microsoft.com/office/powerpoint/2010/main" val="2155762227"/>
+        <p14:creationId xmlns:p14="http://schemas.microsoft.com/office/powerpoint/2010/main" val="2359869069"/>
       </p:ext>
     </p:extLst>
   </p:cSld>
@@ -6792,10 +6793,10 @@
       </p:sp>
       <p:pic>
         <p:nvPicPr>
-          <p:cNvPr id="5" name="Picture 4" descr="A screenshot of a cell phone&#10;&#10;Description automatically generated">
+          <p:cNvPr id="17" name="Picture 16" descr="A screenshot of a cell phone&#10;&#10;Description automatically generated">
             <a:extLst>
               <a:ext uri="{FF2B5EF4-FFF2-40B4-BE49-F238E27FC236}">
-                <a16:creationId xmlns:a16="http://schemas.microsoft.com/office/drawing/2014/main" id="{BF29F94A-9150-4B35-9E68-6EE436913679}"/>
+                <a16:creationId xmlns:a16="http://schemas.microsoft.com/office/drawing/2014/main" id="{1E1E1C06-D5AF-48D2-8D06-17A40550E4B8}"/>
               </a:ext>
             </a:extLst>
           </p:cNvPr>
@@ -6818,7 +6819,7 @@
         </p:blipFill>
         <p:spPr>
           <a:xfrm>
-            <a:off x="608350" y="1652536"/>
+            <a:off x="608350" y="1599782"/>
             <a:ext cx="5487650" cy="3658433"/>
           </a:xfrm>
           <a:prstGeom prst="rect">
@@ -6828,10 +6829,10 @@
       </p:pic>
       <p:pic>
         <p:nvPicPr>
-          <p:cNvPr id="9" name="Picture 8" descr="A screenshot of a cell phone&#10;&#10;Description automatically generated">
+          <p:cNvPr id="23" name="Picture 22" descr="A screenshot of a cell phone&#10;&#10;Description automatically generated">
             <a:extLst>
               <a:ext uri="{FF2B5EF4-FFF2-40B4-BE49-F238E27FC236}">
-                <a16:creationId xmlns:a16="http://schemas.microsoft.com/office/drawing/2014/main" id="{95A604C6-FF66-4A5F-BFF1-8E551BF682D1}"/>
+                <a16:creationId xmlns:a16="http://schemas.microsoft.com/office/drawing/2014/main" id="{C9EBA010-0312-441D-BA77-9A8709716291}"/>
               </a:ext>
             </a:extLst>
           </p:cNvPr>
@@ -6854,7 +6855,7 @@
         </p:blipFill>
         <p:spPr>
           <a:xfrm>
-            <a:off x="6334526" y="1652536"/>
+            <a:off x="6228520" y="1599781"/>
             <a:ext cx="5487650" cy="3658433"/>
           </a:xfrm>
           <a:prstGeom prst="rect">
@@ -6865,7 +6866,7 @@
     </p:spTree>
     <p:extLst>
       <p:ext uri="{BB962C8B-B14F-4D97-AF65-F5344CB8AC3E}">
-        <p14:creationId xmlns:p14="http://schemas.microsoft.com/office/powerpoint/2010/main" val="2333614495"/>
+        <p14:creationId xmlns:p14="http://schemas.microsoft.com/office/powerpoint/2010/main" val="2155762227"/>
       </p:ext>
     </p:extLst>
   </p:cSld>
@@ -6970,7 +6971,7 @@
           <p:cNvPr id="6" name="Picture 5" descr="A screenshot of a cell phone&#10;&#10;Description automatically generated">
             <a:extLst>
               <a:ext uri="{FF2B5EF4-FFF2-40B4-BE49-F238E27FC236}">
-                <a16:creationId xmlns:a16="http://schemas.microsoft.com/office/drawing/2014/main" id="{DE997A4D-C04B-4F0A-85E2-A74969C824A4}"/>
+                <a16:creationId xmlns:a16="http://schemas.microsoft.com/office/drawing/2014/main" id="{4904C225-FD2A-4ABE-982F-B421396FE81D}"/>
               </a:ext>
             </a:extLst>
           </p:cNvPr>
@@ -6993,7 +6994,7 @@
         </p:blipFill>
         <p:spPr>
           <a:xfrm>
-            <a:off x="454230" y="1652536"/>
+            <a:off x="608350" y="1599783"/>
             <a:ext cx="5487650" cy="3658433"/>
           </a:xfrm>
           <a:prstGeom prst="rect">
@@ -7003,10 +7004,10 @@
       </p:pic>
       <p:pic>
         <p:nvPicPr>
-          <p:cNvPr id="11" name="Picture 10" descr="A screenshot of a cell phone&#10;&#10;Description automatically generated">
+          <p:cNvPr id="8" name="Picture 7" descr="A screenshot of a cell phone&#10;&#10;Description automatically generated">
             <a:extLst>
               <a:ext uri="{FF2B5EF4-FFF2-40B4-BE49-F238E27FC236}">
-                <a16:creationId xmlns:a16="http://schemas.microsoft.com/office/drawing/2014/main" id="{F61376C7-2AC1-486A-92F5-EB751533C4A4}"/>
+                <a16:creationId xmlns:a16="http://schemas.microsoft.com/office/drawing/2014/main" id="{0F6E733F-3E78-4AB2-8B72-9C2D621661AE}"/>
               </a:ext>
             </a:extLst>
           </p:cNvPr>
@@ -7029,7 +7030,7 @@
         </p:blipFill>
         <p:spPr>
           <a:xfrm>
-            <a:off x="6250122" y="1652536"/>
+            <a:off x="6228520" y="1599782"/>
             <a:ext cx="5487650" cy="3658433"/>
           </a:xfrm>
           <a:prstGeom prst="rect">
@@ -7040,7 +7041,7 @@
     </p:spTree>
     <p:extLst>
       <p:ext uri="{BB962C8B-B14F-4D97-AF65-F5344CB8AC3E}">
-        <p14:creationId xmlns:p14="http://schemas.microsoft.com/office/powerpoint/2010/main" val="1880460977"/>
+        <p14:creationId xmlns:p14="http://schemas.microsoft.com/office/powerpoint/2010/main" val="2333614495"/>
       </p:ext>
     </p:extLst>
   </p:cSld>
@@ -7145,7 +7146,7 @@
           <p:cNvPr id="5" name="Picture 4" descr="A screenshot of a cell phone&#10;&#10;Description automatically generated">
             <a:extLst>
               <a:ext uri="{FF2B5EF4-FFF2-40B4-BE49-F238E27FC236}">
-                <a16:creationId xmlns:a16="http://schemas.microsoft.com/office/drawing/2014/main" id="{85F90500-A313-4F2B-A9F8-0365D945D477}"/>
+                <a16:creationId xmlns:a16="http://schemas.microsoft.com/office/drawing/2014/main" id="{2D3F6012-E2C4-4621-9968-F63314B132DC}"/>
               </a:ext>
             </a:extLst>
           </p:cNvPr>
@@ -7181,7 +7182,7 @@
           <p:cNvPr id="8" name="Picture 7" descr="A screenshot of a cell phone&#10;&#10;Description automatically generated">
             <a:extLst>
               <a:ext uri="{FF2B5EF4-FFF2-40B4-BE49-F238E27FC236}">
-                <a16:creationId xmlns:a16="http://schemas.microsoft.com/office/drawing/2014/main" id="{46547714-A1BE-4EFD-883A-545287304D52}"/>
+                <a16:creationId xmlns:a16="http://schemas.microsoft.com/office/drawing/2014/main" id="{0A93F326-1EAB-4332-85DF-5F9527414411}"/>
               </a:ext>
             </a:extLst>
           </p:cNvPr>
@@ -7204,7 +7205,7 @@
         </p:blipFill>
         <p:spPr>
           <a:xfrm>
-            <a:off x="6517406" y="1652536"/>
+            <a:off x="6228520" y="1599782"/>
             <a:ext cx="5487650" cy="3658433"/>
           </a:xfrm>
           <a:prstGeom prst="rect">
@@ -7215,7 +7216,7 @@
     </p:spTree>
     <p:extLst>
       <p:ext uri="{BB962C8B-B14F-4D97-AF65-F5344CB8AC3E}">
-        <p14:creationId xmlns:p14="http://schemas.microsoft.com/office/powerpoint/2010/main" val="3936279008"/>
+        <p14:creationId xmlns:p14="http://schemas.microsoft.com/office/powerpoint/2010/main" val="1880460977"/>
       </p:ext>
     </p:extLst>
   </p:cSld>
@@ -7320,7 +7321,7 @@
           <p:cNvPr id="6" name="Picture 5" descr="A screenshot of a cell phone&#10;&#10;Description automatically generated">
             <a:extLst>
               <a:ext uri="{FF2B5EF4-FFF2-40B4-BE49-F238E27FC236}">
-                <a16:creationId xmlns:a16="http://schemas.microsoft.com/office/drawing/2014/main" id="{35AC8A7D-EC6F-4326-B70B-75B9FF268165}"/>
+                <a16:creationId xmlns:a16="http://schemas.microsoft.com/office/drawing/2014/main" id="{440C6B2E-D152-4C3E-95E8-A64910C992F3}"/>
               </a:ext>
             </a:extLst>
           </p:cNvPr>
@@ -7343,7 +7344,7 @@
         </p:blipFill>
         <p:spPr>
           <a:xfrm>
-            <a:off x="608350" y="1652536"/>
+            <a:off x="608350" y="1599783"/>
             <a:ext cx="5487650" cy="3658433"/>
           </a:xfrm>
           <a:prstGeom prst="rect">
@@ -7353,10 +7354,10 @@
       </p:pic>
       <p:pic>
         <p:nvPicPr>
-          <p:cNvPr id="9" name="Picture 8" descr="A screenshot of a cell phone&#10;&#10;Description automatically generated">
+          <p:cNvPr id="11" name="Picture 10" descr="A close up of a map&#10;&#10;Description automatically generated">
             <a:extLst>
               <a:ext uri="{FF2B5EF4-FFF2-40B4-BE49-F238E27FC236}">
-                <a16:creationId xmlns:a16="http://schemas.microsoft.com/office/drawing/2014/main" id="{32B85534-BA07-4230-AE02-60C62701886D}"/>
+                <a16:creationId xmlns:a16="http://schemas.microsoft.com/office/drawing/2014/main" id="{154E14C3-4DF1-4A0A-9925-939C5CEF3839}"/>
               </a:ext>
             </a:extLst>
           </p:cNvPr>
@@ -7379,7 +7380,182 @@
         </p:blipFill>
         <p:spPr>
           <a:xfrm>
-            <a:off x="6433000" y="1652536"/>
+            <a:off x="6228520" y="1599782"/>
+            <a:ext cx="5487650" cy="3658433"/>
+          </a:xfrm>
+          <a:prstGeom prst="rect">
+            <a:avLst/>
+          </a:prstGeom>
+        </p:spPr>
+      </p:pic>
+    </p:spTree>
+    <p:extLst>
+      <p:ext uri="{BB962C8B-B14F-4D97-AF65-F5344CB8AC3E}">
+        <p14:creationId xmlns:p14="http://schemas.microsoft.com/office/powerpoint/2010/main" val="3936279008"/>
+      </p:ext>
+    </p:extLst>
+  </p:cSld>
+  <p:clrMapOvr>
+    <a:masterClrMapping/>
+  </p:clrMapOvr>
+</p:sld>
+</file>
+
+<file path=ppt/slides/slide17.xml><?xml version="1.0" encoding="utf-8"?>
+<p:sld xmlns:a="http://schemas.openxmlformats.org/drawingml/2006/main" xmlns:r="http://schemas.openxmlformats.org/officeDocument/2006/relationships" xmlns:p="http://schemas.openxmlformats.org/presentationml/2006/main">
+  <p:cSld>
+    <p:spTree>
+      <p:nvGrpSpPr>
+        <p:cNvPr id="1" name=""/>
+        <p:cNvGrpSpPr/>
+        <p:nvPr/>
+      </p:nvGrpSpPr>
+      <p:grpSpPr>
+        <a:xfrm>
+          <a:off x="0" y="0"/>
+          <a:ext cx="0" cy="0"/>
+          <a:chOff x="0" y="0"/>
+          <a:chExt cx="0" cy="0"/>
+        </a:xfrm>
+      </p:grpSpPr>
+      <p:sp>
+        <p:nvSpPr>
+          <p:cNvPr id="2" name="Title 1">
+            <a:extLst>
+              <a:ext uri="{FF2B5EF4-FFF2-40B4-BE49-F238E27FC236}">
+                <a16:creationId xmlns:a16="http://schemas.microsoft.com/office/drawing/2014/main" id="{E937C6CA-FAE4-4879-994D-A1E6968C8ADF}"/>
+              </a:ext>
+            </a:extLst>
+          </p:cNvPr>
+          <p:cNvSpPr>
+            <a:spLocks noGrp="1"/>
+          </p:cNvSpPr>
+          <p:nvPr>
+            <p:ph type="ctrTitle"/>
+          </p:nvPr>
+        </p:nvSpPr>
+        <p:spPr>
+          <a:xfrm>
+            <a:off x="1524000" y="629993"/>
+            <a:ext cx="9144000" cy="776775"/>
+          </a:xfrm>
+        </p:spPr>
+        <p:txBody>
+          <a:bodyPr>
+            <a:normAutofit fontScale="90000"/>
+          </a:bodyPr>
+          <a:lstStyle/>
+          <a:p>
+            <a:r>
+              <a:rPr lang="en-US" u="sng" dirty="0"/>
+              <a:t>Results – Job Type </a:t>
+            </a:r>
+          </a:p>
+        </p:txBody>
+      </p:sp>
+      <p:sp>
+        <p:nvSpPr>
+          <p:cNvPr id="3" name="Subtitle 2">
+            <a:extLst>
+              <a:ext uri="{FF2B5EF4-FFF2-40B4-BE49-F238E27FC236}">
+                <a16:creationId xmlns:a16="http://schemas.microsoft.com/office/drawing/2014/main" id="{4F05B62D-E7F8-4411-AE4F-426205E6AF50}"/>
+              </a:ext>
+            </a:extLst>
+          </p:cNvPr>
+          <p:cNvSpPr>
+            <a:spLocks noGrp="1"/>
+          </p:cNvSpPr>
+          <p:nvPr>
+            <p:ph type="subTitle" idx="1"/>
+          </p:nvPr>
+        </p:nvSpPr>
+        <p:spPr>
+          <a:xfrm>
+            <a:off x="1524000" y="5556737"/>
+            <a:ext cx="9144000" cy="900333"/>
+          </a:xfrm>
+        </p:spPr>
+        <p:txBody>
+          <a:bodyPr/>
+          <a:lstStyle/>
+          <a:p>
+            <a:pPr marL="342900" indent="-342900" algn="l">
+              <a:buFont typeface="Arial" panose="020B0604020202020204" pitchFamily="34" charset="0"/>
+              <a:buChar char="•"/>
+            </a:pPr>
+            <a:r>
+              <a:rPr lang="en-US" dirty="0" err="1"/>
+              <a:t>defghi</a:t>
+            </a:r>
+            <a:endParaRPr lang="en-US" dirty="0"/>
+          </a:p>
+        </p:txBody>
+      </p:sp>
+      <p:pic>
+        <p:nvPicPr>
+          <p:cNvPr id="5" name="Picture 4" descr="A screenshot of a cell phone&#10;&#10;Description automatically generated">
+            <a:extLst>
+              <a:ext uri="{FF2B5EF4-FFF2-40B4-BE49-F238E27FC236}">
+                <a16:creationId xmlns:a16="http://schemas.microsoft.com/office/drawing/2014/main" id="{3C4EC751-FFCD-496A-B9D5-09A0684058D1}"/>
+              </a:ext>
+            </a:extLst>
+          </p:cNvPr>
+          <p:cNvPicPr>
+            <a:picLocks noChangeAspect="1"/>
+          </p:cNvPicPr>
+          <p:nvPr/>
+        </p:nvPicPr>
+        <p:blipFill>
+          <a:blip r:embed="rId2">
+            <a:extLst>
+              <a:ext uri="{28A0092B-C50C-407E-A947-70E740481C1C}">
+                <a14:useLocalDpi xmlns:a14="http://schemas.microsoft.com/office/drawing/2010/main" val="0"/>
+              </a:ext>
+            </a:extLst>
+          </a:blip>
+          <a:stretch>
+            <a:fillRect/>
+          </a:stretch>
+        </p:blipFill>
+        <p:spPr>
+          <a:xfrm>
+            <a:off x="608350" y="1599783"/>
+            <a:ext cx="5487650" cy="3658433"/>
+          </a:xfrm>
+          <a:prstGeom prst="rect">
+            <a:avLst/>
+          </a:prstGeom>
+        </p:spPr>
+      </p:pic>
+      <p:pic>
+        <p:nvPicPr>
+          <p:cNvPr id="8" name="Picture 7" descr="A screenshot of a cell phone&#10;&#10;Description automatically generated">
+            <a:extLst>
+              <a:ext uri="{FF2B5EF4-FFF2-40B4-BE49-F238E27FC236}">
+                <a16:creationId xmlns:a16="http://schemas.microsoft.com/office/drawing/2014/main" id="{A1944219-F1EF-42EE-A6D1-1B8BDD36BFA8}"/>
+              </a:ext>
+            </a:extLst>
+          </p:cNvPr>
+          <p:cNvPicPr>
+            <a:picLocks noChangeAspect="1"/>
+          </p:cNvPicPr>
+          <p:nvPr/>
+        </p:nvPicPr>
+        <p:blipFill>
+          <a:blip r:embed="rId3">
+            <a:extLst>
+              <a:ext uri="{28A0092B-C50C-407E-A947-70E740481C1C}">
+                <a14:useLocalDpi xmlns:a14="http://schemas.microsoft.com/office/drawing/2010/main" val="0"/>
+              </a:ext>
+            </a:extLst>
+          </a:blip>
+          <a:stretch>
+            <a:fillRect/>
+          </a:stretch>
+        </p:blipFill>
+        <p:spPr>
+          <a:xfrm>
+            <a:off x="6228520" y="1599782"/>
             <a:ext cx="5487650" cy="3658433"/>
           </a:xfrm>
           <a:prstGeom prst="rect">
@@ -7400,7 +7576,7 @@
 </p:sld>
 </file>
 
-<file path=ppt/slides/slide17.xml><?xml version="1.0" encoding="utf-8"?>
+<file path=ppt/slides/slide18.xml><?xml version="1.0" encoding="utf-8"?>
 <p:sld xmlns:a="http://schemas.openxmlformats.org/drawingml/2006/main" xmlns:r="http://schemas.openxmlformats.org/officeDocument/2006/relationships" xmlns:p="http://schemas.openxmlformats.org/presentationml/2006/main">
   <p:cSld>
     <p:spTree>
@@ -8301,10 +8477,10 @@
       </p:sp>
       <p:pic>
         <p:nvPicPr>
-          <p:cNvPr id="5" name="Picture 4" descr="A screenshot of a cell phone&#10;&#10;Description automatically generated">
+          <p:cNvPr id="6" name="Picture 5" descr="A screenshot of a cell phone&#10;&#10;Description automatically generated">
             <a:extLst>
               <a:ext uri="{FF2B5EF4-FFF2-40B4-BE49-F238E27FC236}">
-                <a16:creationId xmlns:a16="http://schemas.microsoft.com/office/drawing/2014/main" id="{B710FA2C-FAE1-4389-8BB9-36FF867219FA}"/>
+                <a16:creationId xmlns:a16="http://schemas.microsoft.com/office/drawing/2014/main" id="{653AE241-21E8-4130-BA40-1600AE5746DD}"/>
               </a:ext>
             </a:extLst>
           </p:cNvPr>
@@ -8327,7 +8503,7 @@
         </p:blipFill>
         <p:spPr>
           <a:xfrm>
-            <a:off x="890329" y="1406768"/>
+            <a:off x="608350" y="1599783"/>
             <a:ext cx="5487650" cy="3658433"/>
           </a:xfrm>
           <a:prstGeom prst="rect">
@@ -8337,10 +8513,10 @@
       </p:pic>
       <p:pic>
         <p:nvPicPr>
-          <p:cNvPr id="7" name="Picture 6" descr="A screenshot of a cell phone&#10;&#10;Description automatically generated">
+          <p:cNvPr id="9" name="Picture 8" descr="A screenshot of a cell phone&#10;&#10;Description automatically generated">
             <a:extLst>
               <a:ext uri="{FF2B5EF4-FFF2-40B4-BE49-F238E27FC236}">
-                <a16:creationId xmlns:a16="http://schemas.microsoft.com/office/drawing/2014/main" id="{3A240973-BDED-4C87-952B-F2ECA850D025}"/>
+                <a16:creationId xmlns:a16="http://schemas.microsoft.com/office/drawing/2014/main" id="{3A97A22A-EE62-46F0-B965-CB5E05C02EAC}"/>
               </a:ext>
             </a:extLst>
           </p:cNvPr>
@@ -8363,7 +8539,7 @@
         </p:blipFill>
         <p:spPr>
           <a:xfrm>
-            <a:off x="6503338" y="1406768"/>
+            <a:off x="6228520" y="1599782"/>
             <a:ext cx="5487650" cy="3658433"/>
           </a:xfrm>
           <a:prstGeom prst="rect">
@@ -8476,10 +8652,10 @@
       </p:sp>
       <p:pic>
         <p:nvPicPr>
-          <p:cNvPr id="5" name="Picture 4" descr="A screenshot of a cell phone&#10;&#10;Description automatically generated">
+          <p:cNvPr id="6" name="Picture 5" descr="A screenshot of a cell phone&#10;&#10;Description automatically generated">
             <a:extLst>
               <a:ext uri="{FF2B5EF4-FFF2-40B4-BE49-F238E27FC236}">
-                <a16:creationId xmlns:a16="http://schemas.microsoft.com/office/drawing/2014/main" id="{16AB0B12-EC8E-43C2-B077-00C605257C6D}"/>
+                <a16:creationId xmlns:a16="http://schemas.microsoft.com/office/drawing/2014/main" id="{796CA592-D5C1-4D6E-A247-16E0EE45F900}"/>
               </a:ext>
             </a:extLst>
           </p:cNvPr>
@@ -8502,7 +8678,7 @@
         </p:blipFill>
         <p:spPr>
           <a:xfrm>
-            <a:off x="1678119" y="1617367"/>
+            <a:off x="3352175" y="1599783"/>
             <a:ext cx="5487650" cy="3658433"/>
           </a:xfrm>
           <a:prstGeom prst="rect">
@@ -8570,7 +8746,7 @@
           <a:p>
             <a:r>
               <a:rPr lang="en-US" u="sng" dirty="0"/>
-              <a:t>Results – Race</a:t>
+              <a:t>Results – Population</a:t>
             </a:r>
           </a:p>
         </p:txBody>
@@ -8593,8 +8769,8 @@
         </p:nvSpPr>
         <p:spPr>
           <a:xfrm>
-            <a:off x="1524000" y="5570805"/>
-            <a:ext cx="9144000" cy="886265"/>
+            <a:off x="1524000" y="5486399"/>
+            <a:ext cx="9144000" cy="970671"/>
           </a:xfrm>
         </p:spPr>
         <p:txBody>
@@ -8618,7 +8794,7 @@
           <p:cNvPr id="5" name="Picture 4" descr="A screenshot of a cell phone&#10;&#10;Description automatically generated">
             <a:extLst>
               <a:ext uri="{FF2B5EF4-FFF2-40B4-BE49-F238E27FC236}">
-                <a16:creationId xmlns:a16="http://schemas.microsoft.com/office/drawing/2014/main" id="{0460A316-71AF-4F69-BB26-745CC95BAD40}"/>
+                <a16:creationId xmlns:a16="http://schemas.microsoft.com/office/drawing/2014/main" id="{1B30A068-8BC5-4798-92BD-A9EF28143530}"/>
               </a:ext>
             </a:extLst>
           </p:cNvPr>
@@ -8641,43 +8817,7 @@
         </p:blipFill>
         <p:spPr>
           <a:xfrm>
-            <a:off x="608350" y="1406768"/>
-            <a:ext cx="5487650" cy="3658433"/>
-          </a:xfrm>
-          <a:prstGeom prst="rect">
-            <a:avLst/>
-          </a:prstGeom>
-        </p:spPr>
-      </p:pic>
-      <p:pic>
-        <p:nvPicPr>
-          <p:cNvPr id="9" name="Picture 8" descr="A screenshot of a cell phone&#10;&#10;Description automatically generated">
-            <a:extLst>
-              <a:ext uri="{FF2B5EF4-FFF2-40B4-BE49-F238E27FC236}">
-                <a16:creationId xmlns:a16="http://schemas.microsoft.com/office/drawing/2014/main" id="{64EF6EC0-B48A-4D67-B320-04CC3F7A2135}"/>
-              </a:ext>
-            </a:extLst>
-          </p:cNvPr>
-          <p:cNvPicPr>
-            <a:picLocks noChangeAspect="1"/>
-          </p:cNvPicPr>
-          <p:nvPr/>
-        </p:nvPicPr>
-        <p:blipFill>
-          <a:blip r:embed="rId3">
-            <a:extLst>
-              <a:ext uri="{28A0092B-C50C-407E-A947-70E740481C1C}">
-                <a14:useLocalDpi xmlns:a14="http://schemas.microsoft.com/office/drawing/2010/main" val="0"/>
-              </a:ext>
-            </a:extLst>
-          </a:blip>
-          <a:stretch>
-            <a:fillRect/>
-          </a:stretch>
-        </p:blipFill>
-        <p:spPr>
-          <a:xfrm>
-            <a:off x="6362661" y="1406767"/>
+            <a:off x="3352175" y="1599783"/>
             <a:ext cx="5487650" cy="3658433"/>
           </a:xfrm>
           <a:prstGeom prst="rect">
@@ -8688,7 +8828,7 @@
     </p:spTree>
     <p:extLst>
       <p:ext uri="{BB962C8B-B14F-4D97-AF65-F5344CB8AC3E}">
-        <p14:creationId xmlns:p14="http://schemas.microsoft.com/office/powerpoint/2010/main" val="3291382045"/>
+        <p14:creationId xmlns:p14="http://schemas.microsoft.com/office/powerpoint/2010/main" val="1279169618"/>
       </p:ext>
     </p:extLst>
   </p:cSld>

</xml_diff>

<commit_message>
added r-squared values to presentation
</commit_message>
<xml_diff>
--- a/Project 1 Deck.pptx
+++ b/Project 1 Deck.pptx
@@ -16,13 +16,14 @@
     <p:sldId id="277" r:id="rId10"/>
     <p:sldId id="258" r:id="rId11"/>
     <p:sldId id="268" r:id="rId12"/>
-    <p:sldId id="265" r:id="rId13"/>
-    <p:sldId id="269" r:id="rId14"/>
-    <p:sldId id="271" r:id="rId15"/>
-    <p:sldId id="272" r:id="rId16"/>
-    <p:sldId id="274" r:id="rId17"/>
-    <p:sldId id="275" r:id="rId18"/>
-    <p:sldId id="262" r:id="rId19"/>
+    <p:sldId id="278" r:id="rId13"/>
+    <p:sldId id="265" r:id="rId14"/>
+    <p:sldId id="269" r:id="rId15"/>
+    <p:sldId id="271" r:id="rId16"/>
+    <p:sldId id="272" r:id="rId17"/>
+    <p:sldId id="274" r:id="rId18"/>
+    <p:sldId id="275" r:id="rId19"/>
+    <p:sldId id="262" r:id="rId20"/>
   </p:sldIdLst>
   <p:sldSz cx="12192000" cy="6858000"/>
   <p:notesSz cx="6858000" cy="9144000"/>
@@ -6287,18 +6288,45 @@
           </a:xfrm>
         </p:spPr>
         <p:txBody>
-          <a:bodyPr/>
-          <a:lstStyle/>
-          <a:p>
-            <a:pPr marL="342900" indent="-342900" algn="l">
+          <a:bodyPr>
+            <a:normAutofit fontScale="85000" lnSpcReduction="20000"/>
+          </a:bodyPr>
+          <a:lstStyle/>
+          <a:p>
+            <a:pPr marL="342900" indent="-342900">
               <a:buFont typeface="Arial" panose="020B0604020202020204" pitchFamily="34" charset="0"/>
               <a:buChar char="•"/>
             </a:pPr>
             <a:r>
+              <a:rPr lang="en-US" dirty="0"/>
+              <a:t>The r-squared for 2017 percent population of American </a:t>
+            </a:r>
+            <a:r>
               <a:rPr lang="en-US" dirty="0" err="1"/>
-              <a:t>defghi</a:t>
-            </a:r>
-            <a:endParaRPr lang="en-US" dirty="0"/>
+              <a:t>inidans</a:t>
+            </a:r>
+            <a:r>
+              <a:rPr lang="en-US" dirty="0"/>
+              <a:t> and </a:t>
+            </a:r>
+            <a:r>
+              <a:rPr lang="en-US" dirty="0" err="1"/>
+              <a:t>alaskan</a:t>
+            </a:r>
+            <a:r>
+              <a:rPr lang="en-US" dirty="0"/>
+              <a:t> natives is 0.015.</a:t>
+            </a:r>
+          </a:p>
+          <a:p>
+            <a:pPr marL="342900" indent="-342900">
+              <a:buFont typeface="Arial" panose="020B0604020202020204" pitchFamily="34" charset="0"/>
+              <a:buChar char="•"/>
+            </a:pPr>
+            <a:r>
+              <a:rPr lang="en-US" dirty="0"/>
+              <a:t>The r-squared for 2017 percent population of Asians is 0.14.</a:t>
+            </a:r>
           </a:p>
         </p:txBody>
       </p:sp>
@@ -6462,18 +6490,29 @@
           </a:xfrm>
         </p:spPr>
         <p:txBody>
-          <a:bodyPr/>
-          <a:lstStyle/>
-          <a:p>
-            <a:pPr marL="342900" indent="-342900" algn="l">
+          <a:bodyPr>
+            <a:normAutofit fontScale="70000" lnSpcReduction="20000"/>
+          </a:bodyPr>
+          <a:lstStyle/>
+          <a:p>
+            <a:pPr marL="342900" indent="-342900">
               <a:buFont typeface="Arial" panose="020B0604020202020204" pitchFamily="34" charset="0"/>
               <a:buChar char="•"/>
             </a:pPr>
             <a:r>
-              <a:rPr lang="en-US" dirty="0" err="1"/>
-              <a:t>defghi</a:t>
-            </a:r>
-            <a:endParaRPr lang="en-US" dirty="0"/>
+              <a:rPr lang="en-US" dirty="0"/>
+              <a:t>The r-squared for 2017 percent population of Black or African Americans is 0.001.</a:t>
+            </a:r>
+          </a:p>
+          <a:p>
+            <a:pPr marL="342900" indent="-342900">
+              <a:buFont typeface="Arial" panose="020B0604020202020204" pitchFamily="34" charset="0"/>
+              <a:buChar char="•"/>
+            </a:pPr>
+            <a:r>
+              <a:rPr lang="en-US" dirty="0"/>
+              <a:t>The r-squared for 2017 percent population of Native Hawaiians and Other Pacific Islanders is 0.006.</a:t>
+            </a:r>
           </a:p>
         </p:txBody>
       </p:sp>
@@ -6609,7 +6648,7 @@
           <a:p>
             <a:r>
               <a:rPr lang="en-US" u="sng" dirty="0"/>
-              <a:t>Results – Poverty Rate </a:t>
+              <a:t>Results – Race</a:t>
             </a:r>
           </a:p>
         </p:txBody>
@@ -6632,23 +6671,162 @@
         </p:nvSpPr>
         <p:spPr>
           <a:xfrm>
-            <a:off x="1524000" y="5556737"/>
-            <a:ext cx="9144000" cy="900333"/>
-          </a:xfrm>
-        </p:spPr>
-        <p:txBody>
-          <a:bodyPr/>
-          <a:lstStyle/>
-          <a:p>
-            <a:pPr marL="342900" indent="-342900" algn="l">
+            <a:off x="1524000" y="5570805"/>
+            <a:ext cx="9144000" cy="886265"/>
+          </a:xfrm>
+        </p:spPr>
+        <p:txBody>
+          <a:bodyPr>
+            <a:normAutofit/>
+          </a:bodyPr>
+          <a:lstStyle/>
+          <a:p>
+            <a:pPr marL="342900" indent="-342900">
               <a:buFont typeface="Arial" panose="020B0604020202020204" pitchFamily="34" charset="0"/>
               <a:buChar char="•"/>
             </a:pPr>
             <a:r>
-              <a:rPr lang="en-US" dirty="0" err="1"/>
-              <a:t>defghi</a:t>
-            </a:r>
-            <a:endParaRPr lang="en-US" dirty="0"/>
+              <a:rPr lang="en-US" dirty="0"/>
+              <a:t>The r-squared for 2017 percent population of whites is 0.002.</a:t>
+            </a:r>
+          </a:p>
+        </p:txBody>
+      </p:sp>
+      <p:pic>
+        <p:nvPicPr>
+          <p:cNvPr id="5" name="Picture 4" descr="A screenshot of a cell phone&#10;&#10;Description automatically generated">
+            <a:extLst>
+              <a:ext uri="{FF2B5EF4-FFF2-40B4-BE49-F238E27FC236}">
+                <a16:creationId xmlns:a16="http://schemas.microsoft.com/office/drawing/2014/main" id="{45C511ED-90A8-4934-9C16-992F64501C9A}"/>
+              </a:ext>
+            </a:extLst>
+          </p:cNvPr>
+          <p:cNvPicPr>
+            <a:picLocks noChangeAspect="1"/>
+          </p:cNvPicPr>
+          <p:nvPr/>
+        </p:nvPicPr>
+        <p:blipFill>
+          <a:blip r:embed="rId2">
+            <a:extLst>
+              <a:ext uri="{28A0092B-C50C-407E-A947-70E740481C1C}">
+                <a14:useLocalDpi xmlns:a14="http://schemas.microsoft.com/office/drawing/2010/main" val="0"/>
+              </a:ext>
+            </a:extLst>
+          </a:blip>
+          <a:stretch>
+            <a:fillRect/>
+          </a:stretch>
+        </p:blipFill>
+        <p:spPr>
+          <a:xfrm>
+            <a:off x="3352175" y="1599783"/>
+            <a:ext cx="5487650" cy="3658433"/>
+          </a:xfrm>
+          <a:prstGeom prst="rect">
+            <a:avLst/>
+          </a:prstGeom>
+        </p:spPr>
+      </p:pic>
+    </p:spTree>
+    <p:extLst>
+      <p:ext uri="{BB962C8B-B14F-4D97-AF65-F5344CB8AC3E}">
+        <p14:creationId xmlns:p14="http://schemas.microsoft.com/office/powerpoint/2010/main" val="2435305635"/>
+      </p:ext>
+    </p:extLst>
+  </p:cSld>
+  <p:clrMapOvr>
+    <a:masterClrMapping/>
+  </p:clrMapOvr>
+</p:sld>
+</file>
+
+<file path=ppt/slides/slide13.xml><?xml version="1.0" encoding="utf-8"?>
+<p:sld xmlns:a="http://schemas.openxmlformats.org/drawingml/2006/main" xmlns:r="http://schemas.openxmlformats.org/officeDocument/2006/relationships" xmlns:p="http://schemas.openxmlformats.org/presentationml/2006/main">
+  <p:cSld>
+    <p:spTree>
+      <p:nvGrpSpPr>
+        <p:cNvPr id="1" name=""/>
+        <p:cNvGrpSpPr/>
+        <p:nvPr/>
+      </p:nvGrpSpPr>
+      <p:grpSpPr>
+        <a:xfrm>
+          <a:off x="0" y="0"/>
+          <a:ext cx="0" cy="0"/>
+          <a:chOff x="0" y="0"/>
+          <a:chExt cx="0" cy="0"/>
+        </a:xfrm>
+      </p:grpSpPr>
+      <p:sp>
+        <p:nvSpPr>
+          <p:cNvPr id="2" name="Title 1">
+            <a:extLst>
+              <a:ext uri="{FF2B5EF4-FFF2-40B4-BE49-F238E27FC236}">
+                <a16:creationId xmlns:a16="http://schemas.microsoft.com/office/drawing/2014/main" id="{E937C6CA-FAE4-4879-994D-A1E6968C8ADF}"/>
+              </a:ext>
+            </a:extLst>
+          </p:cNvPr>
+          <p:cNvSpPr>
+            <a:spLocks noGrp="1"/>
+          </p:cNvSpPr>
+          <p:nvPr>
+            <p:ph type="ctrTitle"/>
+          </p:nvPr>
+        </p:nvSpPr>
+        <p:spPr>
+          <a:xfrm>
+            <a:off x="1524000" y="629993"/>
+            <a:ext cx="9144000" cy="776775"/>
+          </a:xfrm>
+        </p:spPr>
+        <p:txBody>
+          <a:bodyPr>
+            <a:normAutofit fontScale="90000"/>
+          </a:bodyPr>
+          <a:lstStyle/>
+          <a:p>
+            <a:r>
+              <a:rPr lang="en-US" u="sng" dirty="0"/>
+              <a:t>Results – Poverty Rate </a:t>
+            </a:r>
+          </a:p>
+        </p:txBody>
+      </p:sp>
+      <p:sp>
+        <p:nvSpPr>
+          <p:cNvPr id="3" name="Subtitle 2">
+            <a:extLst>
+              <a:ext uri="{FF2B5EF4-FFF2-40B4-BE49-F238E27FC236}">
+                <a16:creationId xmlns:a16="http://schemas.microsoft.com/office/drawing/2014/main" id="{4F05B62D-E7F8-4411-AE4F-426205E6AF50}"/>
+              </a:ext>
+            </a:extLst>
+          </p:cNvPr>
+          <p:cNvSpPr>
+            <a:spLocks noGrp="1"/>
+          </p:cNvSpPr>
+          <p:nvPr>
+            <p:ph type="subTitle" idx="1"/>
+          </p:nvPr>
+        </p:nvSpPr>
+        <p:spPr>
+          <a:xfrm>
+            <a:off x="1524000" y="5556737"/>
+            <a:ext cx="9144000" cy="900333"/>
+          </a:xfrm>
+        </p:spPr>
+        <p:txBody>
+          <a:bodyPr/>
+          <a:lstStyle/>
+          <a:p>
+            <a:pPr marL="342900" indent="-342900">
+              <a:buFont typeface="Arial" panose="020B0604020202020204" pitchFamily="34" charset="0"/>
+              <a:buChar char="•"/>
+            </a:pPr>
+            <a:r>
+              <a:rPr lang="en-US" dirty="0"/>
+              <a:t>The r-squared for 2017 Poverty Rate is 0.06.</a:t>
+            </a:r>
           </a:p>
         </p:txBody>
       </p:sp>
@@ -6701,7 +6879,7 @@
 </p:sld>
 </file>
 
-<file path=ppt/slides/slide13.xml><?xml version="1.0" encoding="utf-8"?>
+<file path=ppt/slides/slide14.xml><?xml version="1.0" encoding="utf-8"?>
 <p:sld xmlns:a="http://schemas.openxmlformats.org/drawingml/2006/main" xmlns:r="http://schemas.openxmlformats.org/officeDocument/2006/relationships" xmlns:p="http://schemas.openxmlformats.org/presentationml/2006/main">
   <p:cSld>
     <p:spTree>
@@ -6776,18 +6954,29 @@
           </a:xfrm>
         </p:spPr>
         <p:txBody>
-          <a:bodyPr/>
-          <a:lstStyle/>
-          <a:p>
-            <a:pPr marL="342900" indent="-342900" algn="l">
+          <a:bodyPr>
+            <a:normAutofit fontScale="85000" lnSpcReduction="20000"/>
+          </a:bodyPr>
+          <a:lstStyle/>
+          <a:p>
+            <a:pPr marL="342900" indent="-342900">
               <a:buFont typeface="Arial" panose="020B0604020202020204" pitchFamily="34" charset="0"/>
               <a:buChar char="•"/>
             </a:pPr>
             <a:r>
-              <a:rPr lang="en-US" dirty="0" err="1"/>
-              <a:t>defghi</a:t>
-            </a:r>
-            <a:endParaRPr lang="en-US" dirty="0"/>
+              <a:rPr lang="en-US" dirty="0"/>
+              <a:t>The r-squared for Accommodation and food services is 0.043.</a:t>
+            </a:r>
+          </a:p>
+          <a:p>
+            <a:pPr marL="342900" indent="-342900">
+              <a:buFont typeface="Arial" panose="020B0604020202020204" pitchFamily="34" charset="0"/>
+              <a:buChar char="•"/>
+            </a:pPr>
+            <a:r>
+              <a:rPr lang="en-US" dirty="0"/>
+              <a:t>The r-squared for Administrative and support and waste management and remediation services is 0.171.</a:t>
+            </a:r>
           </a:p>
         </p:txBody>
       </p:sp>
@@ -6876,7 +7065,7 @@
 </p:sld>
 </file>
 
-<file path=ppt/slides/slide14.xml><?xml version="1.0" encoding="utf-8"?>
+<file path=ppt/slides/slide15.xml><?xml version="1.0" encoding="utf-8"?>
 <p:sld xmlns:a="http://schemas.openxmlformats.org/drawingml/2006/main" xmlns:r="http://schemas.openxmlformats.org/officeDocument/2006/relationships" xmlns:p="http://schemas.openxmlformats.org/presentationml/2006/main">
   <p:cSld>
     <p:spTree>
@@ -6954,15 +7143,24 @@
           <a:bodyPr/>
           <a:lstStyle/>
           <a:p>
-            <a:pPr marL="342900" indent="-342900" algn="l">
+            <a:pPr marL="342900" indent="-342900">
               <a:buFont typeface="Arial" panose="020B0604020202020204" pitchFamily="34" charset="0"/>
               <a:buChar char="•"/>
             </a:pPr>
             <a:r>
-              <a:rPr lang="en-US" dirty="0" err="1"/>
-              <a:t>defghi</a:t>
-            </a:r>
-            <a:endParaRPr lang="en-US" dirty="0"/>
+              <a:rPr lang="en-US" dirty="0"/>
+              <a:t>The r-squared for Arts, entertainment, and recreation is 0.006.</a:t>
+            </a:r>
+          </a:p>
+          <a:p>
+            <a:pPr marL="342900" indent="-342900">
+              <a:buFont typeface="Arial" panose="020B0604020202020204" pitchFamily="34" charset="0"/>
+              <a:buChar char="•"/>
+            </a:pPr>
+            <a:r>
+              <a:rPr lang="en-US" dirty="0"/>
+              <a:t>The r-squared for Educational services is 0.063.</a:t>
+            </a:r>
           </a:p>
         </p:txBody>
       </p:sp>
@@ -7051,7 +7249,7 @@
 </p:sld>
 </file>
 
-<file path=ppt/slides/slide15.xml><?xml version="1.0" encoding="utf-8"?>
+<file path=ppt/slides/slide16.xml><?xml version="1.0" encoding="utf-8"?>
 <p:sld xmlns:a="http://schemas.openxmlformats.org/drawingml/2006/main" xmlns:r="http://schemas.openxmlformats.org/officeDocument/2006/relationships" xmlns:p="http://schemas.openxmlformats.org/presentationml/2006/main">
   <p:cSld>
     <p:spTree>
@@ -7129,15 +7327,24 @@
           <a:bodyPr/>
           <a:lstStyle/>
           <a:p>
-            <a:pPr marL="342900" indent="-342900" algn="l">
+            <a:pPr marL="342900" indent="-342900">
               <a:buFont typeface="Arial" panose="020B0604020202020204" pitchFamily="34" charset="0"/>
               <a:buChar char="•"/>
             </a:pPr>
             <a:r>
-              <a:rPr lang="en-US" dirty="0" err="1"/>
-              <a:t>defghi</a:t>
-            </a:r>
-            <a:endParaRPr lang="en-US" dirty="0"/>
+              <a:rPr lang="en-US" dirty="0"/>
+              <a:t>The r-squared for Finance and insurance is 0.137.</a:t>
+            </a:r>
+          </a:p>
+          <a:p>
+            <a:pPr marL="342900" indent="-342900">
+              <a:buFont typeface="Arial" panose="020B0604020202020204" pitchFamily="34" charset="0"/>
+              <a:buChar char="•"/>
+            </a:pPr>
+            <a:r>
+              <a:rPr lang="en-US" dirty="0"/>
+              <a:t>The r-squared for Health care and social assistance is 0.096.</a:t>
+            </a:r>
           </a:p>
         </p:txBody>
       </p:sp>
@@ -7226,7 +7433,7 @@
 </p:sld>
 </file>
 
-<file path=ppt/slides/slide16.xml><?xml version="1.0" encoding="utf-8"?>
+<file path=ppt/slides/slide17.xml><?xml version="1.0" encoding="utf-8"?>
 <p:sld xmlns:a="http://schemas.openxmlformats.org/drawingml/2006/main" xmlns:r="http://schemas.openxmlformats.org/officeDocument/2006/relationships" xmlns:p="http://schemas.openxmlformats.org/presentationml/2006/main">
   <p:cSld>
     <p:spTree>
@@ -7301,18 +7508,29 @@
           </a:xfrm>
         </p:spPr>
         <p:txBody>
-          <a:bodyPr/>
-          <a:lstStyle/>
-          <a:p>
-            <a:pPr marL="342900" indent="-342900" algn="l">
+          <a:bodyPr>
+            <a:normAutofit fontScale="85000" lnSpcReduction="20000"/>
+          </a:bodyPr>
+          <a:lstStyle/>
+          <a:p>
+            <a:pPr marL="342900" indent="-342900">
               <a:buFont typeface="Arial" panose="020B0604020202020204" pitchFamily="34" charset="0"/>
               <a:buChar char="•"/>
             </a:pPr>
             <a:r>
-              <a:rPr lang="en-US" dirty="0" err="1"/>
-              <a:t>defghi</a:t>
-            </a:r>
-            <a:endParaRPr lang="en-US" dirty="0"/>
+              <a:rPr lang="en-US" dirty="0"/>
+              <a:t>The r-squared for Information is 0.126.</a:t>
+            </a:r>
+          </a:p>
+          <a:p>
+            <a:pPr marL="342900" indent="-342900">
+              <a:buFont typeface="Arial" panose="020B0604020202020204" pitchFamily="34" charset="0"/>
+              <a:buChar char="•"/>
+            </a:pPr>
+            <a:r>
+              <a:rPr lang="en-US" dirty="0"/>
+              <a:t>The r-squared for Professional, scientific, and technical services is 0.147.</a:t>
+            </a:r>
           </a:p>
         </p:txBody>
       </p:sp>
@@ -7401,7 +7619,7 @@
 </p:sld>
 </file>
 
-<file path=ppt/slides/slide17.xml><?xml version="1.0" encoding="utf-8"?>
+<file path=ppt/slides/slide18.xml><?xml version="1.0" encoding="utf-8"?>
 <p:sld xmlns:a="http://schemas.openxmlformats.org/drawingml/2006/main" xmlns:r="http://schemas.openxmlformats.org/officeDocument/2006/relationships" xmlns:p="http://schemas.openxmlformats.org/presentationml/2006/main">
   <p:cSld>
     <p:spTree>
@@ -7479,15 +7697,24 @@
           <a:bodyPr/>
           <a:lstStyle/>
           <a:p>
-            <a:pPr marL="342900" indent="-342900" algn="l">
+            <a:pPr marL="342900" indent="-342900">
               <a:buFont typeface="Arial" panose="020B0604020202020204" pitchFamily="34" charset="0"/>
               <a:buChar char="•"/>
             </a:pPr>
             <a:r>
-              <a:rPr lang="en-US" dirty="0" err="1"/>
-              <a:t>defghi</a:t>
-            </a:r>
-            <a:endParaRPr lang="en-US" dirty="0"/>
+              <a:rPr lang="en-US" dirty="0"/>
+              <a:t>The r-squared for Real estate and rental and leasing is 0.09.</a:t>
+            </a:r>
+          </a:p>
+          <a:p>
+            <a:pPr marL="342900" indent="-342900">
+              <a:buFont typeface="Arial" panose="020B0604020202020204" pitchFamily="34" charset="0"/>
+              <a:buChar char="•"/>
+            </a:pPr>
+            <a:r>
+              <a:rPr lang="en-US" dirty="0"/>
+              <a:t>The r-squared for Utilities is 0.008.</a:t>
+            </a:r>
           </a:p>
         </p:txBody>
       </p:sp>
@@ -7576,7 +7803,7 @@
 </p:sld>
 </file>
 
-<file path=ppt/slides/slide18.xml><?xml version="1.0" encoding="utf-8"?>
+<file path=ppt/slides/slide19.xml><?xml version="1.0" encoding="utf-8"?>
 <p:sld xmlns:a="http://schemas.openxmlformats.org/drawingml/2006/main" xmlns:r="http://schemas.openxmlformats.org/officeDocument/2006/relationships" xmlns:p="http://schemas.openxmlformats.org/presentationml/2006/main">
   <p:cSld>
     <p:spTree>
@@ -8291,7 +8518,7 @@
             </a:pPr>
             <a:r>
               <a:rPr lang="en-US" dirty="0"/>
-              <a:t>Census API’s were quite cumbersome to use. You could only pull one year at a time, one state at a time, requiring repeated pulls and merges.</a:t>
+              <a:t>Census API’s were quite cumbersome to use. You could only pull one year at a time, one NAICS label at a time, requiring repeated pulls and merges.</a:t>
             </a:r>
           </a:p>
           <a:p>
@@ -8470,8 +8697,24 @@
           <a:bodyPr/>
           <a:lstStyle/>
           <a:p>
-            <a:pPr algn="l"/>
-            <a:endParaRPr lang="en-US" dirty="0"/>
+            <a:pPr marL="342900" indent="-342900" algn="l">
+              <a:buFont typeface="Arial" panose="020B0604020202020204" pitchFamily="34" charset="0"/>
+              <a:buChar char="•"/>
+            </a:pPr>
+            <a:r>
+              <a:rPr lang="en-US" dirty="0"/>
+              <a:t>The r-squared for 2017 household income is 0.204.</a:t>
+            </a:r>
+          </a:p>
+          <a:p>
+            <a:pPr marL="342900" indent="-342900">
+              <a:buFont typeface="Arial" panose="020B0604020202020204" pitchFamily="34" charset="0"/>
+              <a:buChar char="•"/>
+            </a:pPr>
+            <a:r>
+              <a:rPr lang="en-US" dirty="0"/>
+              <a:t>The r-squared for 2017 Per Capita income is 0.176.</a:t>
+            </a:r>
           </a:p>
         </p:txBody>
       </p:sp>
@@ -8638,15 +8881,14 @@
           <a:bodyPr/>
           <a:lstStyle/>
           <a:p>
-            <a:pPr marL="342900" indent="-342900" algn="l">
+            <a:pPr marL="342900" indent="-342900">
               <a:buFont typeface="Arial" panose="020B0604020202020204" pitchFamily="34" charset="0"/>
               <a:buChar char="•"/>
             </a:pPr>
             <a:r>
-              <a:rPr lang="en-US" dirty="0" err="1"/>
-              <a:t>defghi</a:t>
-            </a:r>
-            <a:endParaRPr lang="en-US" dirty="0"/>
+              <a:rPr lang="en-US" dirty="0"/>
+              <a:t>The r-squared for 2017 Median age is 0.07.</a:t>
+            </a:r>
           </a:p>
         </p:txBody>
       </p:sp>
@@ -8777,15 +9019,14 @@
           <a:bodyPr/>
           <a:lstStyle/>
           <a:p>
-            <a:pPr marL="342900" indent="-342900" algn="l">
+            <a:pPr marL="342900" indent="-342900">
               <a:buFont typeface="Arial" panose="020B0604020202020204" pitchFamily="34" charset="0"/>
               <a:buChar char="•"/>
             </a:pPr>
             <a:r>
-              <a:rPr lang="en-US" dirty="0" err="1"/>
-              <a:t>defghi</a:t>
-            </a:r>
-            <a:endParaRPr lang="en-US" dirty="0"/>
+              <a:rPr lang="en-US" dirty="0"/>
+              <a:t>The r-squared for 2017 Population is 0.145.</a:t>
+            </a:r>
           </a:p>
         </p:txBody>
       </p:sp>

</xml_diff>